<commit_message>
Updated webpage tabs, started to updated project page, uploaded all presentations/posters, uploaded workflow PAWN Ishigami-Homma, added Zaid's quote, updated CV, removed Collaborations page (now in Outputs) and News page (now in Events).
</commit_message>
<xml_diff>
--- a/JBA_quote.pptx
+++ b/JBA_quote.pptx
@@ -104,6 +104,11 @@
       </a:defRPr>
     </a:lvl9pPr>
   </p:defaultTextStyle>
+  <p:extLst>
+    <p:ext uri="{EFAFB233-063F-42B5-8137-9DF3F51BA10A}">
+      <p15:sldGuideLst xmlns:p15="http://schemas.microsoft.com/office/powerpoint/2012/main"/>
+    </p:ext>
+  </p:extLst>
 </p:presentation>
 </file>
 
@@ -238,7 +243,7 @@
           <a:p>
             <a:fld id="{6F7ABC96-69A9-4EB5-9269-01A57CAA9BCF}" type="datetimeFigureOut">
               <a:rPr lang="en-GB" smtClean="0"/>
-              <a:t>06/03/2020</a:t>
+              <a:t>08/10/2020</a:t>
             </a:fld>
             <a:endParaRPr lang="en-GB"/>
           </a:p>
@@ -408,7 +413,7 @@
           <a:p>
             <a:fld id="{6F7ABC96-69A9-4EB5-9269-01A57CAA9BCF}" type="datetimeFigureOut">
               <a:rPr lang="en-GB" smtClean="0"/>
-              <a:t>06/03/2020</a:t>
+              <a:t>08/10/2020</a:t>
             </a:fld>
             <a:endParaRPr lang="en-GB"/>
           </a:p>
@@ -588,7 +593,7 @@
           <a:p>
             <a:fld id="{6F7ABC96-69A9-4EB5-9269-01A57CAA9BCF}" type="datetimeFigureOut">
               <a:rPr lang="en-GB" smtClean="0"/>
-              <a:t>06/03/2020</a:t>
+              <a:t>08/10/2020</a:t>
             </a:fld>
             <a:endParaRPr lang="en-GB"/>
           </a:p>
@@ -758,7 +763,7 @@
           <a:p>
             <a:fld id="{6F7ABC96-69A9-4EB5-9269-01A57CAA9BCF}" type="datetimeFigureOut">
               <a:rPr lang="en-GB" smtClean="0"/>
-              <a:t>06/03/2020</a:t>
+              <a:t>08/10/2020</a:t>
             </a:fld>
             <a:endParaRPr lang="en-GB"/>
           </a:p>
@@ -1002,7 +1007,7 @@
           <a:p>
             <a:fld id="{6F7ABC96-69A9-4EB5-9269-01A57CAA9BCF}" type="datetimeFigureOut">
               <a:rPr lang="en-GB" smtClean="0"/>
-              <a:t>06/03/2020</a:t>
+              <a:t>08/10/2020</a:t>
             </a:fld>
             <a:endParaRPr lang="en-GB"/>
           </a:p>
@@ -1234,7 +1239,7 @@
           <a:p>
             <a:fld id="{6F7ABC96-69A9-4EB5-9269-01A57CAA9BCF}" type="datetimeFigureOut">
               <a:rPr lang="en-GB" smtClean="0"/>
-              <a:t>06/03/2020</a:t>
+              <a:t>08/10/2020</a:t>
             </a:fld>
             <a:endParaRPr lang="en-GB"/>
           </a:p>
@@ -1601,7 +1606,7 @@
           <a:p>
             <a:fld id="{6F7ABC96-69A9-4EB5-9269-01A57CAA9BCF}" type="datetimeFigureOut">
               <a:rPr lang="en-GB" smtClean="0"/>
-              <a:t>06/03/2020</a:t>
+              <a:t>08/10/2020</a:t>
             </a:fld>
             <a:endParaRPr lang="en-GB"/>
           </a:p>
@@ -1719,7 +1724,7 @@
           <a:p>
             <a:fld id="{6F7ABC96-69A9-4EB5-9269-01A57CAA9BCF}" type="datetimeFigureOut">
               <a:rPr lang="en-GB" smtClean="0"/>
-              <a:t>06/03/2020</a:t>
+              <a:t>08/10/2020</a:t>
             </a:fld>
             <a:endParaRPr lang="en-GB"/>
           </a:p>
@@ -1814,7 +1819,7 @@
           <a:p>
             <a:fld id="{6F7ABC96-69A9-4EB5-9269-01A57CAA9BCF}" type="datetimeFigureOut">
               <a:rPr lang="en-GB" smtClean="0"/>
-              <a:t>06/03/2020</a:t>
+              <a:t>08/10/2020</a:t>
             </a:fld>
             <a:endParaRPr lang="en-GB"/>
           </a:p>
@@ -2091,7 +2096,7 @@
           <a:p>
             <a:fld id="{6F7ABC96-69A9-4EB5-9269-01A57CAA9BCF}" type="datetimeFigureOut">
               <a:rPr lang="en-GB" smtClean="0"/>
-              <a:t>06/03/2020</a:t>
+              <a:t>08/10/2020</a:t>
             </a:fld>
             <a:endParaRPr lang="en-GB"/>
           </a:p>
@@ -2348,7 +2353,7 @@
           <a:p>
             <a:fld id="{6F7ABC96-69A9-4EB5-9269-01A57CAA9BCF}" type="datetimeFigureOut">
               <a:rPr lang="en-GB" smtClean="0"/>
-              <a:t>06/03/2020</a:t>
+              <a:t>08/10/2020</a:t>
             </a:fld>
             <a:endParaRPr lang="en-GB"/>
           </a:p>
@@ -2561,7 +2566,7 @@
           <a:p>
             <a:fld id="{6F7ABC96-69A9-4EB5-9269-01A57CAA9BCF}" type="datetimeFigureOut">
               <a:rPr lang="en-GB" smtClean="0"/>
-              <a:t>06/03/2020</a:t>
+              <a:t>08/10/2020</a:t>
             </a:fld>
             <a:endParaRPr lang="en-GB"/>
           </a:p>
@@ -3084,6 +3089,16 @@
               </a:spcAft>
             </a:pPr>
             <a:r>
+              <a:rPr lang="en-GB" sz="1500" i="1">
+                <a:solidFill>
+                  <a:srgbClr val="0070C0"/>
+                </a:solidFill>
+                <a:ea typeface="Calibri" panose="020F0502020204030204" pitchFamily="34" charset="0"/>
+                <a:cs typeface="Times New Roman" panose="02020603050405020304" pitchFamily="18" charset="0"/>
+              </a:rPr>
+              <a:t>Dr Kirsty </a:t>
+            </a:r>
+            <a:r>
               <a:rPr lang="en-GB" sz="1500" i="1" dirty="0">
                 <a:solidFill>
                   <a:srgbClr val="0070C0"/>
@@ -3091,7 +3106,7 @@
                 <a:ea typeface="Calibri" panose="020F0502020204030204" pitchFamily="34" charset="0"/>
                 <a:cs typeface="Times New Roman" panose="02020603050405020304" pitchFamily="18" charset="0"/>
               </a:rPr>
-              <a:t>Kirsty Styles (JBA Risk Management)</a:t>
+              <a:t>Styles (JBA Risk Management)</a:t>
             </a:r>
             <a:r>
               <a:rPr lang="it-IT" sz="1500" dirty="0">

</xml_diff>